<commit_message>
agrego ultimos cambios, solo me falta la imagen del proyecto de ogilvy dentro del modal
</commit_message>
<xml_diff>
--- a/img_ref/Presentación1.pptx
+++ b/img_ref/Presentación1.pptx
@@ -6,6 +6,7 @@
   </p:sldMasterIdLst>
   <p:sldIdLst>
     <p:sldId id="256" r:id="rId2"/>
+    <p:sldId id="257" r:id="rId3"/>
   </p:sldIdLst>
   <p:sldSz cx="12192000" cy="6858000"/>
   <p:notesSz cx="6858000" cy="9144000"/>
@@ -243,7 +244,7 @@
           <a:p>
             <a:fld id="{9AAB3570-C34C-4D47-876C-35406FDFB3D0}" type="datetimeFigureOut">
               <a:rPr lang="es-ES" smtClean="0"/>
-              <a:t>20/11/2016</a:t>
+              <a:t>29/11/2016</a:t>
             </a:fld>
             <a:endParaRPr lang="es-ES"/>
           </a:p>
@@ -413,7 +414,7 @@
           <a:p>
             <a:fld id="{9AAB3570-C34C-4D47-876C-35406FDFB3D0}" type="datetimeFigureOut">
               <a:rPr lang="es-ES" smtClean="0"/>
-              <a:t>20/11/2016</a:t>
+              <a:t>29/11/2016</a:t>
             </a:fld>
             <a:endParaRPr lang="es-ES"/>
           </a:p>
@@ -593,7 +594,7 @@
           <a:p>
             <a:fld id="{9AAB3570-C34C-4D47-876C-35406FDFB3D0}" type="datetimeFigureOut">
               <a:rPr lang="es-ES" smtClean="0"/>
-              <a:t>20/11/2016</a:t>
+              <a:t>29/11/2016</a:t>
             </a:fld>
             <a:endParaRPr lang="es-ES"/>
           </a:p>
@@ -763,7 +764,7 @@
           <a:p>
             <a:fld id="{9AAB3570-C34C-4D47-876C-35406FDFB3D0}" type="datetimeFigureOut">
               <a:rPr lang="es-ES" smtClean="0"/>
-              <a:t>20/11/2016</a:t>
+              <a:t>29/11/2016</a:t>
             </a:fld>
             <a:endParaRPr lang="es-ES"/>
           </a:p>
@@ -1009,7 +1010,7 @@
           <a:p>
             <a:fld id="{9AAB3570-C34C-4D47-876C-35406FDFB3D0}" type="datetimeFigureOut">
               <a:rPr lang="es-ES" smtClean="0"/>
-              <a:t>20/11/2016</a:t>
+              <a:t>29/11/2016</a:t>
             </a:fld>
             <a:endParaRPr lang="es-ES"/>
           </a:p>
@@ -1241,7 +1242,7 @@
           <a:p>
             <a:fld id="{9AAB3570-C34C-4D47-876C-35406FDFB3D0}" type="datetimeFigureOut">
               <a:rPr lang="es-ES" smtClean="0"/>
-              <a:t>20/11/2016</a:t>
+              <a:t>29/11/2016</a:t>
             </a:fld>
             <a:endParaRPr lang="es-ES"/>
           </a:p>
@@ -1608,7 +1609,7 @@
           <a:p>
             <a:fld id="{9AAB3570-C34C-4D47-876C-35406FDFB3D0}" type="datetimeFigureOut">
               <a:rPr lang="es-ES" smtClean="0"/>
-              <a:t>20/11/2016</a:t>
+              <a:t>29/11/2016</a:t>
             </a:fld>
             <a:endParaRPr lang="es-ES"/>
           </a:p>
@@ -1726,7 +1727,7 @@
           <a:p>
             <a:fld id="{9AAB3570-C34C-4D47-876C-35406FDFB3D0}" type="datetimeFigureOut">
               <a:rPr lang="es-ES" smtClean="0"/>
-              <a:t>20/11/2016</a:t>
+              <a:t>29/11/2016</a:t>
             </a:fld>
             <a:endParaRPr lang="es-ES"/>
           </a:p>
@@ -1821,7 +1822,7 @@
           <a:p>
             <a:fld id="{9AAB3570-C34C-4D47-876C-35406FDFB3D0}" type="datetimeFigureOut">
               <a:rPr lang="es-ES" smtClean="0"/>
-              <a:t>20/11/2016</a:t>
+              <a:t>29/11/2016</a:t>
             </a:fld>
             <a:endParaRPr lang="es-ES"/>
           </a:p>
@@ -2098,7 +2099,7 @@
           <a:p>
             <a:fld id="{9AAB3570-C34C-4D47-876C-35406FDFB3D0}" type="datetimeFigureOut">
               <a:rPr lang="es-ES" smtClean="0"/>
-              <a:t>20/11/2016</a:t>
+              <a:t>29/11/2016</a:t>
             </a:fld>
             <a:endParaRPr lang="es-ES"/>
           </a:p>
@@ -2351,7 +2352,7 @@
           <a:p>
             <a:fld id="{9AAB3570-C34C-4D47-876C-35406FDFB3D0}" type="datetimeFigureOut">
               <a:rPr lang="es-ES" smtClean="0"/>
-              <a:t>20/11/2016</a:t>
+              <a:t>29/11/2016</a:t>
             </a:fld>
             <a:endParaRPr lang="es-ES"/>
           </a:p>
@@ -2564,7 +2565,7 @@
           <a:p>
             <a:fld id="{9AAB3570-C34C-4D47-876C-35406FDFB3D0}" type="datetimeFigureOut">
               <a:rPr lang="es-ES" smtClean="0"/>
-              <a:t>20/11/2016</a:t>
+              <a:t>29/11/2016</a:t>
             </a:fld>
             <a:endParaRPr lang="es-ES"/>
           </a:p>
@@ -3267,7 +3268,7 @@
                 <a:rPr lang="es-419" sz="1200" dirty="0" smtClean="0">
                   <a:latin typeface="Questrial" panose="02000000000000000000" pitchFamily="2" charset="0"/>
                 </a:rPr>
-                <a:t>Arquitecture Information </a:t>
+                <a:t>Information architecture </a:t>
               </a:r>
               <a:r>
                 <a:rPr lang="es-419" dirty="0" smtClean="0">
@@ -3763,7 +3764,7 @@
         </p:nvSpPr>
         <p:spPr>
           <a:xfrm>
-            <a:off x="1175657" y="1279395"/>
+            <a:off x="300308" y="827970"/>
             <a:ext cx="1080000" cy="1080000"/>
           </a:xfrm>
           <a:prstGeom prst="ellipse">
@@ -4115,6 +4116,35 @@
           </a:p>
         </p:txBody>
       </p:sp>
+      <p:pic>
+        <p:nvPicPr>
+          <p:cNvPr id="3" name="Imagen 2"/>
+          <p:cNvPicPr>
+            <a:picLocks noChangeAspect="1"/>
+          </p:cNvPicPr>
+          <p:nvPr/>
+        </p:nvPicPr>
+        <p:blipFill rotWithShape="1">
+          <a:blip r:embed="rId7" cstate="print">
+            <a:extLst>
+              <a:ext uri="{28A0092B-C50C-407E-A947-70E740481C1C}">
+                <a14:useLocalDpi xmlns:a14="http://schemas.microsoft.com/office/drawing/2010/main" val="0"/>
+              </a:ext>
+            </a:extLst>
+          </a:blip>
+          <a:srcRect l="6591" r="6652" b="13242"/>
+          <a:stretch/>
+        </p:blipFill>
+        <p:spPr>
+          <a:xfrm>
+            <a:off x="3206994" y="365030"/>
+            <a:ext cx="704629" cy="704629"/>
+          </a:xfrm>
+          <a:prstGeom prst="rect">
+            <a:avLst/>
+          </a:prstGeom>
+        </p:spPr>
+      </p:pic>
     </p:spTree>
     <p:extLst>
       <p:ext uri="{BB962C8B-B14F-4D97-AF65-F5344CB8AC3E}">
@@ -4132,6 +4162,354 @@
       </p:par>
     </p:tnLst>
   </p:timing>
+</p:sld>
+</file>
+
+<file path=ppt/slides/slide2.xml><?xml version="1.0" encoding="utf-8"?>
+<p:sld xmlns:a="http://schemas.openxmlformats.org/drawingml/2006/main" xmlns:r="http://schemas.openxmlformats.org/officeDocument/2006/relationships" xmlns:p="http://schemas.openxmlformats.org/presentationml/2006/main">
+  <p:cSld>
+    <p:spTree>
+      <p:nvGrpSpPr>
+        <p:cNvPr id="1" name=""/>
+        <p:cNvGrpSpPr/>
+        <p:nvPr/>
+      </p:nvGrpSpPr>
+      <p:grpSpPr>
+        <a:xfrm>
+          <a:off x="0" y="0"/>
+          <a:ext cx="0" cy="0"/>
+          <a:chOff x="0" y="0"/>
+          <a:chExt cx="0" cy="0"/>
+        </a:xfrm>
+      </p:grpSpPr>
+      <p:pic>
+        <p:nvPicPr>
+          <p:cNvPr id="44" name="Imagen 43"/>
+          <p:cNvPicPr>
+            <a:picLocks noChangeAspect="1"/>
+          </p:cNvPicPr>
+          <p:nvPr/>
+        </p:nvPicPr>
+        <p:blipFill rotWithShape="1">
+          <a:blip r:embed="rId2">
+            <a:extLst>
+              <a:ext uri="{28A0092B-C50C-407E-A947-70E740481C1C}">
+                <a14:useLocalDpi xmlns:a14="http://schemas.microsoft.com/office/drawing/2010/main" val="0"/>
+              </a:ext>
+            </a:extLst>
+          </a:blip>
+          <a:srcRect l="8625" t="14481" r="56410" b="7159"/>
+          <a:stretch/>
+        </p:blipFill>
+        <p:spPr>
+          <a:xfrm>
+            <a:off x="304800" y="539261"/>
+            <a:ext cx="3516923" cy="5064370"/>
+          </a:xfrm>
+          <a:prstGeom prst="rect">
+            <a:avLst/>
+          </a:prstGeom>
+        </p:spPr>
+      </p:pic>
+      <p:pic>
+        <p:nvPicPr>
+          <p:cNvPr id="46" name="Imagen 45"/>
+          <p:cNvPicPr>
+            <a:picLocks noChangeAspect="1"/>
+          </p:cNvPicPr>
+          <p:nvPr/>
+        </p:nvPicPr>
+        <p:blipFill rotWithShape="1">
+          <a:blip r:embed="rId3"/>
+          <a:srcRect l="8735" t="14664" r="40448" b="5209"/>
+          <a:stretch/>
+        </p:blipFill>
+        <p:spPr>
+          <a:xfrm>
+            <a:off x="8182706" y="539261"/>
+            <a:ext cx="6260125" cy="5549756"/>
+          </a:xfrm>
+          <a:prstGeom prst="rect">
+            <a:avLst/>
+          </a:prstGeom>
+        </p:spPr>
+      </p:pic>
+      <p:pic>
+        <p:nvPicPr>
+          <p:cNvPr id="50" name="Imagen 49"/>
+          <p:cNvPicPr>
+            <a:picLocks noChangeAspect="1"/>
+          </p:cNvPicPr>
+          <p:nvPr/>
+        </p:nvPicPr>
+        <p:blipFill rotWithShape="1">
+          <a:blip r:embed="rId4"/>
+          <a:srcRect l="8554" t="14023" r="56487" b="4888"/>
+          <a:stretch/>
+        </p:blipFill>
+        <p:spPr>
+          <a:xfrm>
+            <a:off x="10175632" y="2719755"/>
+            <a:ext cx="3516923" cy="5064370"/>
+          </a:xfrm>
+          <a:prstGeom prst="rect">
+            <a:avLst/>
+          </a:prstGeom>
+        </p:spPr>
+      </p:pic>
+      <p:grpSp>
+        <p:nvGrpSpPr>
+          <p:cNvPr id="8" name="Grupo 7"/>
+          <p:cNvGrpSpPr/>
+          <p:nvPr/>
+        </p:nvGrpSpPr>
+        <p:grpSpPr>
+          <a:xfrm>
+            <a:off x="-3382107" y="-606799"/>
+            <a:ext cx="8572500" cy="6858000"/>
+            <a:chOff x="-3382107" y="-606799"/>
+            <a:chExt cx="8572500" cy="6858000"/>
+          </a:xfrm>
+        </p:grpSpPr>
+        <p:sp>
+          <p:nvSpPr>
+            <p:cNvPr id="3" name="Rectángulo 2"/>
+            <p:cNvSpPr/>
+            <p:nvPr/>
+          </p:nvSpPr>
+          <p:spPr>
+            <a:xfrm>
+              <a:off x="-3382107" y="-606799"/>
+              <a:ext cx="8572500" cy="6858000"/>
+            </a:xfrm>
+            <a:prstGeom prst="rect">
+              <a:avLst/>
+            </a:prstGeom>
+            <a:solidFill>
+              <a:schemeClr val="bg1"/>
+            </a:solidFill>
+            <a:ln>
+              <a:solidFill>
+                <a:schemeClr val="bg1"/>
+              </a:solidFill>
+            </a:ln>
+          </p:spPr>
+          <p:style>
+            <a:lnRef idx="2">
+              <a:schemeClr val="accent1">
+                <a:shade val="50000"/>
+              </a:schemeClr>
+            </a:lnRef>
+            <a:fillRef idx="1">
+              <a:schemeClr val="accent1"/>
+            </a:fillRef>
+            <a:effectRef idx="0">
+              <a:schemeClr val="accent1"/>
+            </a:effectRef>
+            <a:fontRef idx="minor">
+              <a:schemeClr val="lt1"/>
+            </a:fontRef>
+          </p:style>
+          <p:txBody>
+            <a:bodyPr rtlCol="0" anchor="ctr"/>
+            <a:lstStyle/>
+            <a:p>
+              <a:pPr algn="ctr"/>
+              <a:endParaRPr lang="es-ES"/>
+            </a:p>
+          </p:txBody>
+        </p:sp>
+        <p:pic>
+          <p:nvPicPr>
+            <p:cNvPr id="1026" name="Picture 2" descr="https://lh4.googleusercontent.com/KNjr7PtRCUaz50S__oDMyVFyK1HfLxmsPvcxJoPb4ozp9I0zVtorNWyx9u0MfTloGq_4mxZO8hIpfIx8C1uCIiYypeLd5UEsLNM7TTXozM4G2Wgzgs_WljmXXqaoy4vDwxQHc3KP0gc"/>
+            <p:cNvPicPr>
+              <a:picLocks noChangeAspect="1" noChangeArrowheads="1"/>
+            </p:cNvPicPr>
+            <p:nvPr/>
+          </p:nvPicPr>
+          <p:blipFill>
+            <a:blip r:embed="rId5">
+              <a:extLst>
+                <a:ext uri="{28A0092B-C50C-407E-A947-70E740481C1C}">
+                  <a14:useLocalDpi xmlns:a14="http://schemas.microsoft.com/office/drawing/2010/main" val="0"/>
+                </a:ext>
+              </a:extLst>
+            </a:blip>
+            <a:srcRect/>
+            <a:stretch>
+              <a:fillRect/>
+            </a:stretch>
+          </p:blipFill>
+          <p:spPr bwMode="auto">
+            <a:xfrm>
+              <a:off x="-467778" y="539261"/>
+              <a:ext cx="2832300" cy="2832300"/>
+            </a:xfrm>
+            <a:prstGeom prst="rect">
+              <a:avLst/>
+            </a:prstGeom>
+            <a:noFill/>
+            <a:extLst>
+              <a:ext uri="{909E8E84-426E-40DD-AFC4-6F175D3DCCD1}">
+                <a14:hiddenFill xmlns:a14="http://schemas.microsoft.com/office/drawing/2010/main">
+                  <a:solidFill>
+                    <a:srgbClr val="FFFFFF"/>
+                  </a:solidFill>
+                </a14:hiddenFill>
+              </a:ext>
+            </a:extLst>
+          </p:spPr>
+        </p:pic>
+        <p:pic>
+          <p:nvPicPr>
+            <p:cNvPr id="1028" name="Picture 4" descr="https://lh5.googleusercontent.com/xvfPvhSm08N3eOgBYxNBsqfy7vuCJ1wXE5TxTxywz4uh4uivvNrVWAdN1Q0npRTxkjDK4yZueKEY8CjY9mKlgeAWuwtPJai3X_IirCSeGwOYC3RZm-fHk4V4Axi7RXnN_WAU9Es-qKo"/>
+            <p:cNvPicPr>
+              <a:picLocks noChangeAspect="1" noChangeArrowheads="1"/>
+            </p:cNvPicPr>
+            <p:nvPr/>
+          </p:nvPicPr>
+          <p:blipFill>
+            <a:blip r:embed="rId6">
+              <a:extLst>
+                <a:ext uri="{28A0092B-C50C-407E-A947-70E740481C1C}">
+                  <a14:useLocalDpi xmlns:a14="http://schemas.microsoft.com/office/drawing/2010/main" val="0"/>
+                </a:ext>
+              </a:extLst>
+            </a:blip>
+            <a:srcRect/>
+            <a:stretch>
+              <a:fillRect/>
+            </a:stretch>
+          </p:blipFill>
+          <p:spPr bwMode="auto">
+            <a:xfrm>
+              <a:off x="-467778" y="3392830"/>
+              <a:ext cx="2832300" cy="1462007"/>
+            </a:xfrm>
+            <a:prstGeom prst="rect">
+              <a:avLst/>
+            </a:prstGeom>
+            <a:noFill/>
+            <a:extLst>
+              <a:ext uri="{909E8E84-426E-40DD-AFC4-6F175D3DCCD1}">
+                <a14:hiddenFill xmlns:a14="http://schemas.microsoft.com/office/drawing/2010/main">
+                  <a:solidFill>
+                    <a:srgbClr val="FFFFFF"/>
+                  </a:solidFill>
+                </a14:hiddenFill>
+              </a:ext>
+            </a:extLst>
+          </p:spPr>
+        </p:pic>
+        <p:sp>
+          <p:nvSpPr>
+            <p:cNvPr id="7" name="CuadroTexto 6"/>
+            <p:cNvSpPr txBox="1"/>
+            <p:nvPr/>
+          </p:nvSpPr>
+          <p:spPr>
+            <a:xfrm>
+              <a:off x="432075" y="2822201"/>
+              <a:ext cx="899532" cy="584775"/>
+            </a:xfrm>
+            <a:prstGeom prst="rect">
+              <a:avLst/>
+            </a:prstGeom>
+            <a:noFill/>
+          </p:spPr>
+          <p:txBody>
+            <a:bodyPr wrap="square" rtlCol="0">
+              <a:spAutoFit/>
+            </a:bodyPr>
+            <a:lstStyle/>
+            <a:p>
+              <a:pPr algn="ctr"/>
+              <a:r>
+                <a:rPr lang="es-419" sz="3200" b="1" dirty="0" smtClean="0">
+                  <a:solidFill>
+                    <a:srgbClr val="E73A6A"/>
+                  </a:solidFill>
+                </a:rPr>
+                <a:t>+</a:t>
+              </a:r>
+              <a:endParaRPr lang="es-ES" sz="3200" b="1" dirty="0">
+                <a:solidFill>
+                  <a:srgbClr val="E73A6A"/>
+                </a:solidFill>
+              </a:endParaRPr>
+            </a:p>
+          </p:txBody>
+        </p:sp>
+      </p:grpSp>
+      <p:pic>
+        <p:nvPicPr>
+          <p:cNvPr id="2" name="Imagen 1"/>
+          <p:cNvPicPr>
+            <a:picLocks noChangeAspect="1"/>
+          </p:cNvPicPr>
+          <p:nvPr/>
+        </p:nvPicPr>
+        <p:blipFill rotWithShape="1">
+          <a:blip r:embed="rId7">
+            <a:extLst>
+              <a:ext uri="{28A0092B-C50C-407E-A947-70E740481C1C}">
+                <a14:useLocalDpi xmlns:a14="http://schemas.microsoft.com/office/drawing/2010/main" val="0"/>
+              </a:ext>
+            </a:extLst>
+          </a:blip>
+          <a:srcRect b="19179"/>
+          <a:stretch/>
+        </p:blipFill>
+        <p:spPr>
+          <a:xfrm>
+            <a:off x="1236478" y="0"/>
+            <a:ext cx="9719043" cy="5542671"/>
+          </a:xfrm>
+          <a:prstGeom prst="rect">
+            <a:avLst/>
+          </a:prstGeom>
+        </p:spPr>
+      </p:pic>
+      <p:pic>
+        <p:nvPicPr>
+          <p:cNvPr id="4" name="Imagen 3"/>
+          <p:cNvPicPr>
+            <a:picLocks noChangeAspect="1"/>
+          </p:cNvPicPr>
+          <p:nvPr/>
+        </p:nvPicPr>
+        <p:blipFill>
+          <a:blip r:embed="rId8">
+            <a:extLst>
+              <a:ext uri="{28A0092B-C50C-407E-A947-70E740481C1C}">
+                <a14:useLocalDpi xmlns:a14="http://schemas.microsoft.com/office/drawing/2010/main" val="0"/>
+              </a:ext>
+            </a:extLst>
+          </a:blip>
+          <a:stretch>
+            <a:fillRect/>
+          </a:stretch>
+        </p:blipFill>
+        <p:spPr>
+          <a:xfrm>
+            <a:off x="-467778" y="539261"/>
+            <a:ext cx="4853089" cy="6858000"/>
+          </a:xfrm>
+          <a:prstGeom prst="rect">
+            <a:avLst/>
+          </a:prstGeom>
+        </p:spPr>
+      </p:pic>
+    </p:spTree>
+    <p:extLst>
+      <p:ext uri="{BB962C8B-B14F-4D97-AF65-F5344CB8AC3E}">
+        <p14:creationId xmlns:p14="http://schemas.microsoft.com/office/powerpoint/2010/main" val="4034168274"/>
+      </p:ext>
+    </p:extLst>
+  </p:cSld>
+  <p:clrMapOvr>
+    <a:masterClrMapping/>
+  </p:clrMapOvr>
 </p:sld>
 </file>
 

</xml_diff>